<commit_message>
Will's typos on L5.3 and GP5.3
</commit_message>
<xml_diff>
--- a/Slides/Lesson 5.3 Lists of Lists.pptx
+++ b/Slides/Lesson 5.3 Lists of Lists.pptx
@@ -269,7 +269,7 @@
           <a:p>
             <a:fld id="{1AC50D25-69DA-4251-A3B1-10895C6A89D6}" type="datetimeFigureOut">
               <a:rPr lang="en-US" smtClean="0"/>
-              <a:t>8/9/2017</a:t>
+              <a:t>8/11/2017</a:t>
             </a:fld>
             <a:endParaRPr lang="en-US"/>
           </a:p>
@@ -1017,7 +1017,7 @@
           <a:p>
             <a:fld id="{2F1F79F5-7BEC-496A-AFC7-876E38F64D71}" type="datetime1">
               <a:rPr lang="en-US" smtClean="0"/>
-              <a:t>8/9/2017</a:t>
+              <a:t>8/11/2017</a:t>
             </a:fld>
             <a:endParaRPr lang="en-US"/>
           </a:p>
@@ -1112,7 +1112,7 @@
           <a:p>
             <a:fld id="{0A05703A-7669-4FEA-9056-25299B4D29D4}" type="datetime1">
               <a:rPr lang="en-US" smtClean="0"/>
-              <a:t>8/9/2017</a:t>
+              <a:t>8/11/2017</a:t>
             </a:fld>
             <a:endParaRPr lang="en-US"/>
           </a:p>
@@ -1387,7 +1387,7 @@
           <a:p>
             <a:fld id="{6E5077B5-BB57-49DB-88CA-226A139E5C01}" type="datetime1">
               <a:rPr lang="en-US" smtClean="0"/>
-              <a:t>8/9/2017</a:t>
+              <a:t>8/11/2017</a:t>
             </a:fld>
             <a:endParaRPr lang="en-US"/>
           </a:p>
@@ -1639,7 +1639,7 @@
           <a:p>
             <a:fld id="{C48D9447-CBD6-49A1-89FD-8512A8CF8999}" type="datetime1">
               <a:rPr lang="en-US" smtClean="0"/>
-              <a:t>8/9/2017</a:t>
+              <a:t>8/11/2017</a:t>
             </a:fld>
             <a:endParaRPr lang="en-US"/>
           </a:p>
@@ -1807,7 +1807,7 @@
           <a:p>
             <a:fld id="{A3639A2A-823D-48B7-9ACE-7FAF42870BA9}" type="datetime1">
               <a:rPr lang="en-US" smtClean="0"/>
-              <a:t>8/9/2017</a:t>
+              <a:t>8/11/2017</a:t>
             </a:fld>
             <a:endParaRPr lang="en-US"/>
           </a:p>
@@ -1985,7 +1985,7 @@
           <a:p>
             <a:fld id="{ED1B6996-82E9-463C-972C-7B56056E426C}" type="datetime1">
               <a:rPr lang="en-US" smtClean="0"/>
-              <a:t>8/9/2017</a:t>
+              <a:t>8/11/2017</a:t>
             </a:fld>
             <a:endParaRPr lang="en-US"/>
           </a:p>
@@ -2225,7 +2225,7 @@
           <a:p>
             <a:fld id="{2F1F79F5-7BEC-496A-AFC7-876E38F64D71}" type="datetime1">
               <a:rPr lang="en-US" smtClean="0"/>
-              <a:t>8/9/2017</a:t>
+              <a:t>8/11/2017</a:t>
             </a:fld>
             <a:endParaRPr lang="en-US"/>
           </a:p>
@@ -2399,7 +2399,7 @@
           <a:p>
             <a:fld id="{E22ED4DA-448D-4BB1-B935-CC112220207B}" type="datetime1">
               <a:rPr lang="en-US" smtClean="0"/>
-              <a:t>8/9/2017</a:t>
+              <a:t>8/11/2017</a:t>
             </a:fld>
             <a:endParaRPr lang="en-US"/>
           </a:p>
@@ -2572,7 +2572,7 @@
           <a:p>
             <a:fld id="{E22ED4DA-448D-4BB1-B935-CC112220207B}" type="datetime1">
               <a:rPr lang="en-US" smtClean="0"/>
-              <a:t>8/9/2017</a:t>
+              <a:t>8/11/2017</a:t>
             </a:fld>
             <a:endParaRPr lang="en-US"/>
           </a:p>
@@ -2832,7 +2832,7 @@
           <a:p>
             <a:fld id="{FF5D65A6-AB94-4435-B0B7-3743215FA46C}" type="datetime1">
               <a:rPr lang="en-US" smtClean="0"/>
-              <a:t>8/9/2017</a:t>
+              <a:t>8/11/2017</a:t>
             </a:fld>
             <a:endParaRPr lang="en-US"/>
           </a:p>
@@ -3008,7 +3008,7 @@
           <a:p>
             <a:fld id="{FF5D65A6-AB94-4435-B0B7-3743215FA46C}" type="datetime1">
               <a:rPr lang="en-US" smtClean="0"/>
-              <a:t>8/9/2017</a:t>
+              <a:t>8/11/2017</a:t>
             </a:fld>
             <a:endParaRPr lang="en-US"/>
           </a:p>
@@ -3231,7 +3231,7 @@
           <a:p>
             <a:fld id="{E22ED4DA-448D-4BB1-B935-CC112220207B}" type="datetime1">
               <a:rPr lang="en-US" smtClean="0"/>
-              <a:t>8/9/2017</a:t>
+              <a:t>8/11/2017</a:t>
             </a:fld>
             <a:endParaRPr lang="en-US"/>
           </a:p>
@@ -3476,7 +3476,7 @@
           <a:p>
             <a:fld id="{7C193DC4-6EF0-48C9-B29C-616106A645E1}" type="datetime1">
               <a:rPr lang="en-US" smtClean="0"/>
-              <a:t>8/9/2017</a:t>
+              <a:t>8/11/2017</a:t>
             </a:fld>
             <a:endParaRPr lang="en-US"/>
           </a:p>
@@ -3761,7 +3761,7 @@
           <a:p>
             <a:fld id="{5D1846AD-9252-4647-9435-4C2AC365653A}" type="datetime1">
               <a:rPr lang="en-US" smtClean="0"/>
-              <a:t>8/9/2017</a:t>
+              <a:t>8/11/2017</a:t>
             </a:fld>
             <a:endParaRPr lang="en-US"/>
           </a:p>
@@ -4180,7 +4180,7 @@
           <a:p>
             <a:fld id="{CE56DC10-3561-4063-A6AF-C1CC7A41040A}" type="datetime1">
               <a:rPr lang="en-US" smtClean="0"/>
-              <a:t>8/9/2017</a:t>
+              <a:t>8/11/2017</a:t>
             </a:fld>
             <a:endParaRPr lang="en-US"/>
           </a:p>
@@ -4297,7 +4297,7 @@
           <a:p>
             <a:fld id="{2F7B77F5-1464-4F6B-92A8-64FC8A508293}" type="datetime1">
               <a:rPr lang="en-US" smtClean="0"/>
-              <a:t>8/9/2017</a:t>
+              <a:t>8/11/2017</a:t>
             </a:fld>
             <a:endParaRPr lang="en-US"/>
           </a:p>
@@ -4392,7 +4392,7 @@
           <a:p>
             <a:fld id="{0A05703A-7669-4FEA-9056-25299B4D29D4}" type="datetime1">
               <a:rPr lang="en-US" smtClean="0"/>
-              <a:t>8/9/2017</a:t>
+              <a:t>8/11/2017</a:t>
             </a:fld>
             <a:endParaRPr lang="en-US"/>
           </a:p>
@@ -4667,7 +4667,7 @@
           <a:p>
             <a:fld id="{6E5077B5-BB57-49DB-88CA-226A139E5C01}" type="datetime1">
               <a:rPr lang="en-US" smtClean="0"/>
-              <a:t>8/9/2017</a:t>
+              <a:t>8/11/2017</a:t>
             </a:fld>
             <a:endParaRPr lang="en-US"/>
           </a:p>
@@ -4919,7 +4919,7 @@
           <a:p>
             <a:fld id="{C48D9447-CBD6-49A1-89FD-8512A8CF8999}" type="datetime1">
               <a:rPr lang="en-US" smtClean="0"/>
-              <a:t>8/9/2017</a:t>
+              <a:t>8/11/2017</a:t>
             </a:fld>
             <a:endParaRPr lang="en-US"/>
           </a:p>
@@ -5087,7 +5087,7 @@
           <a:p>
             <a:fld id="{A3639A2A-823D-48B7-9ACE-7FAF42870BA9}" type="datetime1">
               <a:rPr lang="en-US" smtClean="0"/>
-              <a:t>8/9/2017</a:t>
+              <a:t>8/11/2017</a:t>
             </a:fld>
             <a:endParaRPr lang="en-US"/>
           </a:p>
@@ -5265,7 +5265,7 @@
           <a:p>
             <a:fld id="{ED1B6996-82E9-463C-972C-7B56056E426C}" type="datetime1">
               <a:rPr lang="en-US" smtClean="0"/>
-              <a:t>8/9/2017</a:t>
+              <a:t>8/11/2017</a:t>
             </a:fld>
             <a:endParaRPr lang="en-US"/>
           </a:p>
@@ -5438,7 +5438,7 @@
           <a:p>
             <a:fld id="{E22ED4DA-448D-4BB1-B935-CC112220207B}" type="datetime1">
               <a:rPr lang="en-US" smtClean="0"/>
-              <a:t>8/9/2017</a:t>
+              <a:t>8/11/2017</a:t>
             </a:fld>
             <a:endParaRPr lang="en-US"/>
           </a:p>
@@ -5698,7 +5698,7 @@
           <a:p>
             <a:fld id="{FF5D65A6-AB94-4435-B0B7-3743215FA46C}" type="datetime1">
               <a:rPr lang="en-US" smtClean="0"/>
-              <a:t>8/9/2017</a:t>
+              <a:t>8/11/2017</a:t>
             </a:fld>
             <a:endParaRPr lang="en-US"/>
           </a:p>
@@ -5874,7 +5874,7 @@
           <a:p>
             <a:fld id="{FF5D65A6-AB94-4435-B0B7-3743215FA46C}" type="datetime1">
               <a:rPr lang="en-US" smtClean="0"/>
-              <a:t>8/9/2017</a:t>
+              <a:t>8/11/2017</a:t>
             </a:fld>
             <a:endParaRPr lang="en-US"/>
           </a:p>
@@ -6168,7 +6168,7 @@
           <a:p>
             <a:fld id="{7C193DC4-6EF0-48C9-B29C-616106A645E1}" type="datetime1">
               <a:rPr lang="en-US" smtClean="0"/>
-              <a:t>8/9/2017</a:t>
+              <a:t>8/11/2017</a:t>
             </a:fld>
             <a:endParaRPr lang="en-US"/>
           </a:p>
@@ -6453,7 +6453,7 @@
           <a:p>
             <a:fld id="{5D1846AD-9252-4647-9435-4C2AC365653A}" type="datetime1">
               <a:rPr lang="en-US" smtClean="0"/>
-              <a:t>8/9/2017</a:t>
+              <a:t>8/11/2017</a:t>
             </a:fld>
             <a:endParaRPr lang="en-US"/>
           </a:p>
@@ -6872,7 +6872,7 @@
           <a:p>
             <a:fld id="{CE56DC10-3561-4063-A6AF-C1CC7A41040A}" type="datetime1">
               <a:rPr lang="en-US" smtClean="0"/>
-              <a:t>8/9/2017</a:t>
+              <a:t>8/11/2017</a:t>
             </a:fld>
             <a:endParaRPr lang="en-US"/>
           </a:p>
@@ -6989,7 +6989,7 @@
           <a:p>
             <a:fld id="{2F7B77F5-1464-4F6B-92A8-64FC8A508293}" type="datetime1">
               <a:rPr lang="en-US" smtClean="0"/>
-              <a:t>8/9/2017</a:t>
+              <a:t>8/11/2017</a:t>
             </a:fld>
             <a:endParaRPr lang="en-US"/>
           </a:p>
@@ -7212,7 +7212,7 @@
           <a:p>
             <a:fld id="{02B3F677-983B-48DB-ADFD-63FE6CBC7FB2}" type="datetime1">
               <a:rPr lang="en-US" smtClean="0"/>
-              <a:t>8/9/2017</a:t>
+              <a:t>8/11/2017</a:t>
             </a:fld>
             <a:endParaRPr lang="en-US"/>
           </a:p>
@@ -7736,7 +7736,7 @@
           <a:p>
             <a:fld id="{02B3F677-983B-48DB-ADFD-63FE6CBC7FB2}" type="datetime1">
               <a:rPr lang="en-US" smtClean="0"/>
-              <a:t>8/9/2017</a:t>
+              <a:t>8/11/2017</a:t>
             </a:fld>
             <a:endParaRPr lang="en-US"/>
           </a:p>
@@ -9422,6 +9422,41 @@
               </a:rPr>
               <a:t>.</a:t>
             </a:r>
+          </a:p>
+        </p:txBody>
+      </p:sp>
+      <p:sp>
+        <p:nvSpPr>
+          <p:cNvPr id="55" name="Line 13"/>
+          <p:cNvSpPr>
+            <a:spLocks noChangeShapeType="1"/>
+          </p:cNvSpPr>
+          <p:nvPr/>
+        </p:nvSpPr>
+        <p:spPr bwMode="auto">
+          <a:xfrm>
+            <a:off x="1595560" y="2438400"/>
+            <a:ext cx="0" cy="533400"/>
+          </a:xfrm>
+          <a:prstGeom prst="line">
+            <a:avLst/>
+          </a:prstGeom>
+          <a:noFill/>
+          <a:ln w="9525">
+            <a:solidFill>
+              <a:schemeClr val="tx1"/>
+            </a:solidFill>
+            <a:round/>
+            <a:headEnd/>
+            <a:tailEnd type="triangle" w="med" len="med"/>
+          </a:ln>
+          <a:effectLst/>
+        </p:spPr>
+        <p:txBody>
+          <a:bodyPr wrap="none" anchor="ctr"/>
+          <a:lstStyle/>
+          <a:p>
+            <a:endParaRPr lang="en-US"/>
           </a:p>
         </p:txBody>
       </p:sp>
@@ -11100,6 +11135,41 @@
           </a:p>
         </p:txBody>
       </p:sp>
+      <p:sp>
+        <p:nvSpPr>
+          <p:cNvPr id="49" name="Line 13"/>
+          <p:cNvSpPr>
+            <a:spLocks noChangeShapeType="1"/>
+          </p:cNvSpPr>
+          <p:nvPr/>
+        </p:nvSpPr>
+        <p:spPr bwMode="auto">
+          <a:xfrm>
+            <a:off x="833702" y="3200400"/>
+            <a:ext cx="0" cy="533400"/>
+          </a:xfrm>
+          <a:prstGeom prst="line">
+            <a:avLst/>
+          </a:prstGeom>
+          <a:noFill/>
+          <a:ln w="9525">
+            <a:solidFill>
+              <a:schemeClr val="tx1"/>
+            </a:solidFill>
+            <a:round/>
+            <a:headEnd/>
+            <a:tailEnd type="triangle" w="med" len="med"/>
+          </a:ln>
+          <a:effectLst/>
+        </p:spPr>
+        <p:txBody>
+          <a:bodyPr wrap="none" anchor="ctr"/>
+          <a:lstStyle/>
+          <a:p>
+            <a:endParaRPr lang="en-US"/>
+          </a:p>
+        </p:txBody>
+      </p:sp>
     </p:spTree>
     <p:extLst>
       <p:ext uri="{BB962C8B-B14F-4D97-AF65-F5344CB8AC3E}">
@@ -19143,6 +19213,41 @@
               <a:t>A list of S-expressions is implemented as a singly-linked list.  Here is an example.</a:t>
             </a:r>
             <a:endParaRPr lang="en-US" dirty="0"/>
+          </a:p>
+        </p:txBody>
+      </p:sp>
+      <p:sp>
+        <p:nvSpPr>
+          <p:cNvPr id="19" name="Line 13"/>
+          <p:cNvSpPr>
+            <a:spLocks noChangeShapeType="1"/>
+          </p:cNvSpPr>
+          <p:nvPr/>
+        </p:nvSpPr>
+        <p:spPr bwMode="auto">
+          <a:xfrm>
+            <a:off x="3853473" y="4044951"/>
+            <a:ext cx="0" cy="533400"/>
+          </a:xfrm>
+          <a:prstGeom prst="line">
+            <a:avLst/>
+          </a:prstGeom>
+          <a:noFill/>
+          <a:ln w="9525">
+            <a:solidFill>
+              <a:schemeClr val="tx1"/>
+            </a:solidFill>
+            <a:round/>
+            <a:headEnd/>
+            <a:tailEnd type="triangle" w="med" len="med"/>
+          </a:ln>
+          <a:effectLst/>
+        </p:spPr>
+        <p:txBody>
+          <a:bodyPr wrap="none" anchor="ctr"/>
+          <a:lstStyle/>
+          <a:p>
+            <a:endParaRPr lang="en-US"/>
           </a:p>
         </p:txBody>
       </p:sp>

</xml_diff>